<commit_message>
Final updated Read Me File
</commit_message>
<xml_diff>
--- a/Final_Presentation.pptx
+++ b/Final_Presentation.pptx
@@ -5,7 +5,7 @@
     <p:sldMasterId id="2147483648" r:id="rId1"/>
   </p:sldMasterIdLst>
   <p:notesMasterIdLst>
-    <p:notesMasterId r:id="rId16"/>
+    <p:notesMasterId r:id="rId15"/>
   </p:notesMasterIdLst>
   <p:sldIdLst>
     <p:sldId id="256" r:id="rId2"/>
@@ -21,7 +21,6 @@
     <p:sldId id="277" r:id="rId12"/>
     <p:sldId id="280" r:id="rId13"/>
     <p:sldId id="275" r:id="rId14"/>
-    <p:sldId id="263" r:id="rId15"/>
   </p:sldIdLst>
   <p:sldSz cx="9144000" cy="6858000" type="screen4x3"/>
   <p:notesSz cx="6858000" cy="9144000"/>
@@ -4114,138 +4113,6 @@
 </file>
 
 <file path=ppt/slides/slide13.xml><?xml version="1.0" encoding="utf-8"?>
-<p:sld xmlns:a="http://schemas.openxmlformats.org/drawingml/2006/main" xmlns:r="http://schemas.openxmlformats.org/officeDocument/2006/relationships" xmlns:p="http://schemas.openxmlformats.org/presentationml/2006/main">
-  <p:cSld>
-    <p:spTree>
-      <p:nvGrpSpPr>
-        <p:cNvPr id="1" name=""/>
-        <p:cNvGrpSpPr/>
-        <p:nvPr/>
-      </p:nvGrpSpPr>
-      <p:grpSpPr>
-        <a:xfrm>
-          <a:off x="0" y="0"/>
-          <a:ext cx="0" cy="0"/>
-          <a:chOff x="0" y="0"/>
-          <a:chExt cx="0" cy="0"/>
-        </a:xfrm>
-      </p:grpSpPr>
-      <p:sp>
-        <p:nvSpPr>
-          <p:cNvPr id="2" name="Title 1"/>
-          <p:cNvSpPr>
-            <a:spLocks noGrp="1"/>
-          </p:cNvSpPr>
-          <p:nvPr>
-            <p:ph type="title"/>
-          </p:nvPr>
-        </p:nvSpPr>
-        <p:spPr/>
-        <p:txBody>
-          <a:bodyPr>
-            <a:normAutofit/>
-          </a:bodyPr>
-          <a:lstStyle/>
-          <a:p>
-            <a:r>
-              <a:rPr sz="4000" b="1" dirty="0">
-                <a:solidFill>
-                  <a:srgbClr val="004C6D"/>
-                </a:solidFill>
-              </a:rPr>
-              <a:t>Thank You – Questions?</a:t>
-            </a:r>
-          </a:p>
-        </p:txBody>
-      </p:sp>
-      <p:sp>
-        <p:nvSpPr>
-          <p:cNvPr id="3" name="Content Placeholder 2"/>
-          <p:cNvSpPr>
-            <a:spLocks noGrp="1"/>
-          </p:cNvSpPr>
-          <p:nvPr>
-            <p:ph idx="1"/>
-          </p:nvPr>
-        </p:nvSpPr>
-        <p:spPr>
-          <a:xfrm>
-            <a:off x="457200" y="1654630"/>
-            <a:ext cx="8229600" cy="4525963"/>
-          </a:xfrm>
-        </p:spPr>
-        <p:txBody>
-          <a:bodyPr>
-            <a:normAutofit/>
-          </a:bodyPr>
-          <a:lstStyle/>
-          <a:p>
-            <a:r>
-              <a:rPr sz="2600" dirty="0">
-                <a:solidFill>
-                  <a:srgbClr val="323232"/>
-                </a:solidFill>
-              </a:rPr>
-              <a:t>Vincent </a:t>
-            </a:r>
-            <a:r>
-              <a:rPr sz="2600" dirty="0" err="1">
-                <a:solidFill>
-                  <a:srgbClr val="323232"/>
-                </a:solidFill>
-              </a:rPr>
-              <a:t>Barchok</a:t>
-            </a:r>
-            <a:r>
-              <a:rPr sz="2600" dirty="0">
-                <a:solidFill>
-                  <a:srgbClr val="323232"/>
-                </a:solidFill>
-              </a:rPr>
-              <a:t> Ngochoch</a:t>
-            </a:r>
-          </a:p>
-          <a:p>
-            <a:r>
-              <a:rPr sz="2600" dirty="0">
-                <a:solidFill>
-                  <a:srgbClr val="323232"/>
-                </a:solidFill>
-              </a:rPr>
-              <a:t>Email: vbarchok@gmail.com</a:t>
-            </a:r>
-          </a:p>
-          <a:p>
-            <a:r>
-              <a:rPr sz="2600" dirty="0">
-                <a:solidFill>
-                  <a:srgbClr val="323232"/>
-                </a:solidFill>
-              </a:rPr>
-              <a:t>LinkedIn: www.linkedin.com/in/vincent-ngochoch-94095b64</a:t>
-            </a:r>
-          </a:p>
-          <a:p>
-            <a:r>
-              <a:rPr sz="2600" dirty="0">
-                <a:solidFill>
-                  <a:srgbClr val="323232"/>
-                </a:solidFill>
-              </a:rPr>
-              <a:t>Happy to take any questions.</a:t>
-            </a:r>
-          </a:p>
-        </p:txBody>
-      </p:sp>
-    </p:spTree>
-  </p:cSld>
-  <p:clrMapOvr>
-    <a:masterClrMapping/>
-  </p:clrMapOvr>
-</p:sld>
-</file>
-
-<file path=ppt/slides/slide14.xml><?xml version="1.0" encoding="utf-8"?>
 <p:sld xmlns:a="http://schemas.openxmlformats.org/drawingml/2006/main" xmlns:r="http://schemas.openxmlformats.org/officeDocument/2006/relationships" xmlns:p="http://schemas.openxmlformats.org/presentationml/2006/main">
   <p:cSld>
     <p:spTree>

</xml_diff>